<commit_message>
Reports included, fixed login screen
</commit_message>
<xml_diff>
--- a/Delivered/Inception/Project Slides.pptx
+++ b/Delivered/Inception/Project Slides.pptx
@@ -10,7 +10,8 @@
     <p:sldId id="263" r:id="rId4"/>
     <p:sldId id="264" r:id="rId5"/>
     <p:sldId id="265" r:id="rId6"/>
-    <p:sldId id="258" r:id="rId7"/>
+    <p:sldId id="267" r:id="rId7"/>
+    <p:sldId id="258" r:id="rId8"/>
   </p:sldIdLst>
   <p:sldSz cx="12192000" cy="6858000"/>
   <p:notesSz cx="6858000" cy="9144000"/>
@@ -361,7 +362,7 @@
           <a:p>
             <a:fld id="{9184DA70-C731-4C70-880D-CCD4705E623C}" type="datetime1">
               <a:rPr lang="en-US" smtClean="0"/>
-              <a:t>3/4/2020</a:t>
+              <a:t>4/6/2020</a:t>
             </a:fld>
             <a:endParaRPr lang="en-US" dirty="0"/>
           </a:p>
@@ -549,7 +550,7 @@
           <a:p>
             <a:fld id="{B612A279-0833-481D-8C56-F67FD0AC6C50}" type="datetime1">
               <a:rPr lang="en-US" smtClean="0"/>
-              <a:t>3/4/2020</a:t>
+              <a:t>4/6/2020</a:t>
             </a:fld>
             <a:endParaRPr lang="en-US" dirty="0"/>
           </a:p>
@@ -791,7 +792,7 @@
           <a:p>
             <a:fld id="{6587DA83-5663-4C9C-B9AA-0B40A3DAFF81}" type="datetime1">
               <a:rPr lang="en-US" smtClean="0"/>
-              <a:t>3/4/2020</a:t>
+              <a:t>4/6/2020</a:t>
             </a:fld>
             <a:endParaRPr lang="en-US" dirty="0"/>
           </a:p>
@@ -979,7 +980,7 @@
           <a:p>
             <a:fld id="{4BE1D723-8F53-4F53-90B0-1982A396982E}" type="datetime1">
               <a:rPr lang="en-US" smtClean="0"/>
-              <a:t>3/4/2020</a:t>
+              <a:t>4/6/2020</a:t>
             </a:fld>
             <a:endParaRPr lang="en-US" dirty="0"/>
           </a:p>
@@ -1352,7 +1353,7 @@
           <a:p>
             <a:fld id="{97669AF7-7BEB-44E4-9852-375E34362B5B}" type="datetime1">
               <a:rPr lang="en-US" smtClean="0"/>
-              <a:t>3/4/2020</a:t>
+              <a:t>4/6/2020</a:t>
             </a:fld>
             <a:endParaRPr lang="en-US" dirty="0"/>
           </a:p>
@@ -1607,7 +1608,7 @@
           <a:p>
             <a:fld id="{BAAAC38D-0552-4C82-B593-E6124DFADBE2}" type="datetime1">
               <a:rPr lang="en-US" smtClean="0"/>
-              <a:t>3/4/2020</a:t>
+              <a:t>4/6/2020</a:t>
             </a:fld>
             <a:endParaRPr lang="en-US" dirty="0"/>
           </a:p>
@@ -2004,7 +2005,7 @@
           <a:p>
             <a:fld id="{D9DF0F1C-5577-4ACB-BB62-DF8F3C494C7E}" type="datetime1">
               <a:rPr lang="en-US" smtClean="0"/>
-              <a:t>3/4/2020</a:t>
+              <a:t>4/6/2020</a:t>
             </a:fld>
             <a:endParaRPr lang="en-US" dirty="0"/>
           </a:p>
@@ -2140,7 +2141,7 @@
           <a:p>
             <a:fld id="{1775B394-D9F9-4F0C-B15D-605F45CB9E9F}" type="datetime1">
               <a:rPr lang="en-US" smtClean="0"/>
-              <a:t>3/4/2020</a:t>
+              <a:t>4/6/2020</a:t>
             </a:fld>
             <a:endParaRPr lang="en-US" dirty="0"/>
           </a:p>
@@ -2297,7 +2298,7 @@
           <a:p>
             <a:fld id="{39667345-2558-425A-8533-9BFDBCE15005}" type="datetime1">
               <a:rPr lang="en-US" smtClean="0"/>
-              <a:t>3/4/2020</a:t>
+              <a:t>4/6/2020</a:t>
             </a:fld>
             <a:endParaRPr lang="en-US" dirty="0"/>
           </a:p>
@@ -2626,7 +2627,7 @@
           <a:p>
             <a:fld id="{92BEA474-078D-4E9B-9B14-09A87B19DC46}" type="datetime1">
               <a:rPr lang="en-US" smtClean="0"/>
-              <a:t>3/4/2020</a:t>
+              <a:t>4/6/2020</a:t>
             </a:fld>
             <a:endParaRPr lang="en-US" dirty="0"/>
           </a:p>
@@ -2976,7 +2977,7 @@
           <a:p>
             <a:fld id="{4907D986-8816-4272-A432-0437A28A9828}" type="datetime1">
               <a:rPr lang="en-US" smtClean="0"/>
-              <a:t>3/4/2020</a:t>
+              <a:t>4/6/2020</a:t>
             </a:fld>
             <a:endParaRPr lang="en-US" dirty="0"/>
           </a:p>
@@ -3237,7 +3238,7 @@
           <a:p>
             <a:fld id="{62D6E202-B606-4609-B914-27C9371A1F6D}" type="datetime1">
               <a:rPr lang="en-US" smtClean="0"/>
-              <a:t>3/4/2020</a:t>
+              <a:t>4/6/2020</a:t>
             </a:fld>
             <a:endParaRPr lang="en-US" dirty="0"/>
           </a:p>
@@ -3858,6 +3859,13 @@
           <a:p>
             <a:pPr algn="ctr"/>
             <a:r>
+              <a:rPr lang="en-US" dirty="0"/>
+              <a:t>Winter 2020</a:t>
+            </a:r>
+            <a:br>
+              <a:rPr lang="en-US" sz="8000" dirty="0"/>
+            </a:br>
+            <a:r>
               <a:rPr lang="en-US" sz="8000" dirty="0"/>
               <a:t>Computer Programmer:</a:t>
             </a:r>
@@ -4834,7 +4842,7 @@
         </p:nvSpPr>
         <p:spPr>
           <a:xfrm>
-            <a:off x="5286999" y="2359075"/>
+            <a:off x="5230010" y="129759"/>
             <a:ext cx="6253317" cy="2582271"/>
           </a:xfrm>
         </p:spPr>
@@ -4847,7 +4855,7 @@
             <a:pPr algn="ctr"/>
             <a:r>
               <a:rPr lang="en-US" sz="6000" dirty="0"/>
-              <a:t>Organize and Update your inventory system today!</a:t>
+              <a:t>What does it do?</a:t>
             </a:r>
             <a:br>
               <a:rPr lang="en-US" sz="6000" dirty="0"/>
@@ -4963,8 +4971,8 @@
         </p:nvSpPr>
         <p:spPr>
           <a:xfrm>
-            <a:off x="5427754" y="3540962"/>
-            <a:ext cx="5712826" cy="1569660"/>
+            <a:off x="5459517" y="1250768"/>
+            <a:ext cx="5712826" cy="3724096"/>
           </a:xfrm>
           <a:prstGeom prst="rect">
             <a:avLst/>
@@ -4983,7 +4991,47 @@
             </a:pPr>
             <a:r>
               <a:rPr lang="en-CA" sz="2000" dirty="0"/>
-              <a:t>Find products quickly and easily</a:t>
+              <a:t>Find and add products quickly and easily</a:t>
+            </a:r>
+          </a:p>
+          <a:p>
+            <a:pPr marL="285750" indent="-285750">
+              <a:buFontTx/>
+              <a:buChar char="-"/>
+            </a:pPr>
+            <a:r>
+              <a:rPr lang="en-CA" sz="2000" dirty="0"/>
+              <a:t>Find and add employees</a:t>
+            </a:r>
+          </a:p>
+          <a:p>
+            <a:pPr marL="285750" indent="-285750">
+              <a:buFontTx/>
+              <a:buChar char="-"/>
+            </a:pPr>
+            <a:r>
+              <a:rPr lang="en-CA" sz="2000" dirty="0"/>
+              <a:t>Create incoming and outgoing orders with multiple products for each location</a:t>
+            </a:r>
+          </a:p>
+          <a:p>
+            <a:pPr marL="285750" indent="-285750">
+              <a:buFontTx/>
+              <a:buChar char="-"/>
+            </a:pPr>
+            <a:r>
+              <a:rPr lang="en-CA" sz="2000" dirty="0"/>
+              <a:t>Reports generated to show complete individual store inventory and transactions with a specified date range</a:t>
+            </a:r>
+          </a:p>
+          <a:p>
+            <a:pPr marL="285750" indent="-285750">
+              <a:buFontTx/>
+              <a:buChar char="-"/>
+            </a:pPr>
+            <a:r>
+              <a:rPr lang="en-CA" sz="2000" dirty="0"/>
+              <a:t>Bulk import inventory data</a:t>
             </a:r>
           </a:p>
           <a:p>
@@ -5613,6 +5661,176 @@
 </file>
 
 <file path=ppt/slides/slide6.xml><?xml version="1.0" encoding="utf-8"?>
+<p:sld xmlns:a="http://schemas.openxmlformats.org/drawingml/2006/main" xmlns:r="http://schemas.openxmlformats.org/officeDocument/2006/relationships" xmlns:p="http://schemas.openxmlformats.org/presentationml/2006/main">
+  <p:cSld>
+    <p:spTree>
+      <p:nvGrpSpPr>
+        <p:cNvPr id="1" name=""/>
+        <p:cNvGrpSpPr/>
+        <p:nvPr/>
+      </p:nvGrpSpPr>
+      <p:grpSpPr>
+        <a:xfrm>
+          <a:off x="0" y="0"/>
+          <a:ext cx="0" cy="0"/>
+          <a:chOff x="0" y="0"/>
+          <a:chExt cx="0" cy="0"/>
+        </a:xfrm>
+      </p:grpSpPr>
+      <p:sp>
+        <p:nvSpPr>
+          <p:cNvPr id="2" name="Title 1">
+            <a:extLst>
+              <a:ext uri="{FF2B5EF4-FFF2-40B4-BE49-F238E27FC236}">
+                <a16:creationId xmlns:a16="http://schemas.microsoft.com/office/drawing/2014/main" id="{78FD68DA-43BA-4508-8DE2-BA9BB7B2FA5B}"/>
+              </a:ext>
+            </a:extLst>
+          </p:cNvPr>
+          <p:cNvSpPr>
+            <a:spLocks noGrp="1"/>
+          </p:cNvSpPr>
+          <p:nvPr>
+            <p:ph type="ctrTitle"/>
+          </p:nvPr>
+        </p:nvSpPr>
+        <p:spPr>
+          <a:xfrm>
+            <a:off x="5068885" y="-1291136"/>
+            <a:ext cx="6253317" cy="2582271"/>
+          </a:xfrm>
+        </p:spPr>
+        <p:txBody>
+          <a:bodyPr>
+            <a:normAutofit/>
+          </a:bodyPr>
+          <a:lstStyle/>
+          <a:p>
+            <a:pPr algn="ctr"/>
+            <a:r>
+              <a:rPr lang="en-US" sz="6000" dirty="0"/>
+              <a:t>Conclusion</a:t>
+            </a:r>
+          </a:p>
+        </p:txBody>
+      </p:sp>
+      <p:pic>
+        <p:nvPicPr>
+          <p:cNvPr id="5" name="Picture 4" descr="A picture containing building, sitting, bench, side&#10;&#10;Description automatically generated">
+            <a:extLst>
+              <a:ext uri="{FF2B5EF4-FFF2-40B4-BE49-F238E27FC236}">
+                <a16:creationId xmlns:a16="http://schemas.microsoft.com/office/drawing/2014/main" id="{282CF6DD-7FE8-4063-9551-1B7BBCE92ABE}"/>
+              </a:ext>
+            </a:extLst>
+          </p:cNvPr>
+          <p:cNvPicPr>
+            <a:picLocks noChangeAspect="1"/>
+          </p:cNvPicPr>
+          <p:nvPr/>
+        </p:nvPicPr>
+        <p:blipFill rotWithShape="1">
+          <a:blip r:embed="rId2">
+            <a:extLst>
+              <a:ext uri="{28A0092B-C50C-407E-A947-70E740481C1C}">
+                <a14:useLocalDpi xmlns:a14="http://schemas.microsoft.com/office/drawing/2010/main" val="0"/>
+              </a:ext>
+            </a:extLst>
+          </a:blip>
+          <a:srcRect/>
+          <a:stretch/>
+        </p:blipFill>
+        <p:spPr>
+          <a:xfrm>
+            <a:off x="-1" y="1"/>
+            <a:ext cx="4635315" cy="6857999"/>
+          </a:xfrm>
+          <a:prstGeom prst="rect">
+            <a:avLst/>
+          </a:prstGeom>
+        </p:spPr>
+      </p:pic>
+      <p:sp>
+        <p:nvSpPr>
+          <p:cNvPr id="3" name="TextBox 2">
+            <a:extLst>
+              <a:ext uri="{FF2B5EF4-FFF2-40B4-BE49-F238E27FC236}">
+                <a16:creationId xmlns:a16="http://schemas.microsoft.com/office/drawing/2014/main" id="{57435302-68D6-4731-BB3F-AAA83003C66B}"/>
+              </a:ext>
+            </a:extLst>
+          </p:cNvPr>
+          <p:cNvSpPr txBox="1"/>
+          <p:nvPr/>
+        </p:nvSpPr>
+        <p:spPr>
+          <a:xfrm>
+            <a:off x="5427754" y="2108066"/>
+            <a:ext cx="5712826" cy="1477328"/>
+          </a:xfrm>
+          <a:prstGeom prst="rect">
+            <a:avLst/>
+          </a:prstGeom>
+          <a:noFill/>
+        </p:spPr>
+        <p:txBody>
+          <a:bodyPr wrap="square" rtlCol="0">
+            <a:spAutoFit/>
+          </a:bodyPr>
+          <a:lstStyle/>
+          <a:p>
+            <a:endParaRPr lang="en-CA" dirty="0"/>
+          </a:p>
+          <a:p>
+            <a:pPr marL="285750" indent="-285750">
+              <a:buFontTx/>
+              <a:buChar char="-"/>
+            </a:pPr>
+            <a:r>
+              <a:rPr lang="en-CA" dirty="0"/>
+              <a:t>All project documentation delivered</a:t>
+            </a:r>
+          </a:p>
+          <a:p>
+            <a:pPr marL="285750" indent="-285750">
+              <a:buFontTx/>
+              <a:buChar char="-"/>
+            </a:pPr>
+            <a:r>
+              <a:rPr lang="en-CA" dirty="0"/>
+              <a:t>All project requirements completed</a:t>
+            </a:r>
+          </a:p>
+          <a:p>
+            <a:pPr marL="285750" indent="-285750">
+              <a:buFontTx/>
+              <a:buChar char="-"/>
+            </a:pPr>
+            <a:r>
+              <a:rPr lang="en-CA" dirty="0"/>
+              <a:t>Delivered working software project</a:t>
+            </a:r>
+          </a:p>
+          <a:p>
+            <a:pPr marL="285750" indent="-285750">
+              <a:buFontTx/>
+              <a:buChar char="-"/>
+            </a:pPr>
+            <a:endParaRPr lang="en-CA" dirty="0"/>
+          </a:p>
+        </p:txBody>
+      </p:sp>
+    </p:spTree>
+    <p:extLst>
+      <p:ext uri="{BB962C8B-B14F-4D97-AF65-F5344CB8AC3E}">
+        <p14:creationId xmlns:p14="http://schemas.microsoft.com/office/powerpoint/2010/main" val="4137612777"/>
+      </p:ext>
+    </p:extLst>
+  </p:cSld>
+  <p:clrMapOvr>
+    <a:masterClrMapping/>
+  </p:clrMapOvr>
+</p:sld>
+</file>
+
+<file path=ppt/slides/slide7.xml><?xml version="1.0" encoding="utf-8"?>
 <p:sld xmlns:a="http://schemas.openxmlformats.org/drawingml/2006/main" xmlns:r="http://schemas.openxmlformats.org/officeDocument/2006/relationships" xmlns:p="http://schemas.openxmlformats.org/presentationml/2006/main">
   <p:cSld>
     <p:bg>

</xml_diff>